<commit_message>
Revising Standard Error definition
</commit_message>
<xml_diff>
--- a/lectures/Lect04_ModelSelection.pptx
+++ b/lectures/Lect04_ModelSelection.pptx
@@ -249,7 +249,7 @@
           <a:p>
             <a:fld id="{B7D6DDD3-D7E9-488B-B626-1E8285E424D8}" type="datetimeFigureOut">
               <a:rPr lang="en-US" smtClean="0"/>
-              <a:t>2/3/18</a:t>
+              <a:t>2/4/18</a:t>
             </a:fld>
             <a:endParaRPr lang="en-US"/>
           </a:p>
@@ -9973,8 +9973,8 @@
           </a:p>
         </p:txBody>
       </p:sp>
-      <mc:AlternateContent xmlns:mc="http://schemas.openxmlformats.org/markup-compatibility/2006">
-        <mc:Choice xmlns:a14="http://schemas.microsoft.com/office/drawing/2010/main" Requires="a14">
+      <mc:AlternateContent xmlns:mc="http://schemas.openxmlformats.org/markup-compatibility/2006" xmlns:a14="http://schemas.microsoft.com/office/drawing/2010/main">
+        <mc:Choice Requires="a14">
           <p:sp>
             <p:nvSpPr>
               <p:cNvPr id="3" name="Content Placeholder 2">
@@ -10516,7 +10516,7 @@
             </p:txBody>
           </p:sp>
         </mc:Choice>
-        <mc:Fallback>
+        <mc:Fallback xmlns="">
           <p:sp>
             <p:nvSpPr>
               <p:cNvPr id="3" name="Content Placeholder 2">
@@ -14044,8 +14044,8 @@
           </a:p>
         </p:txBody>
       </p:sp>
-      <mc:AlternateContent xmlns:mc="http://schemas.openxmlformats.org/markup-compatibility/2006">
-        <mc:Choice xmlns:a14="http://schemas.microsoft.com/office/drawing/2010/main" Requires="a14">
+      <mc:AlternateContent xmlns:mc="http://schemas.openxmlformats.org/markup-compatibility/2006" xmlns:a14="http://schemas.microsoft.com/office/drawing/2010/main">
+        <mc:Choice Requires="a14">
           <p:sp>
             <p:nvSpPr>
               <p:cNvPr id="3" name="Content Placeholder 2">
@@ -14904,7 +14904,7 @@
             </p:txBody>
           </p:sp>
         </mc:Choice>
-        <mc:Fallback>
+        <mc:Fallback xmlns="">
           <p:sp>
             <p:nvSpPr>
               <p:cNvPr id="3" name="Content Placeholder 2">
@@ -15196,8 +15196,8 @@
           </a:p>
         </p:txBody>
       </p:sp>
-      <mc:AlternateContent xmlns:mc="http://schemas.openxmlformats.org/markup-compatibility/2006">
-        <mc:Choice xmlns:a14="http://schemas.microsoft.com/office/drawing/2010/main" Requires="a14">
+      <mc:AlternateContent xmlns:mc="http://schemas.openxmlformats.org/markup-compatibility/2006" xmlns:a14="http://schemas.microsoft.com/office/drawing/2010/main">
+        <mc:Choice Requires="a14">
           <p:sp>
             <p:nvSpPr>
               <p:cNvPr id="3" name="Content Placeholder 2">
@@ -15624,7 +15624,7 @@
             </p:txBody>
           </p:sp>
         </mc:Choice>
-        <mc:Fallback>
+        <mc:Fallback xmlns="">
           <p:sp>
             <p:nvSpPr>
               <p:cNvPr id="3" name="Content Placeholder 2">
@@ -16213,8 +16213,8 @@
           </a:p>
         </p:txBody>
       </p:sp>
-      <mc:AlternateContent xmlns:mc="http://schemas.openxmlformats.org/markup-compatibility/2006">
-        <mc:Choice xmlns:a14="http://schemas.microsoft.com/office/drawing/2010/main" Requires="a14">
+      <mc:AlternateContent xmlns:mc="http://schemas.openxmlformats.org/markup-compatibility/2006" xmlns:a14="http://schemas.microsoft.com/office/drawing/2010/main">
+        <mc:Choice Requires="a14">
           <p:sp>
             <p:nvSpPr>
               <p:cNvPr id="3" name="Content Placeholder 2">
@@ -17195,7 +17195,7 @@
             </p:txBody>
           </p:sp>
         </mc:Choice>
-        <mc:Fallback>
+        <mc:Fallback xmlns="">
           <p:sp>
             <p:nvSpPr>
               <p:cNvPr id="3" name="Content Placeholder 2">
@@ -17322,8 +17322,8 @@
           </a:p>
         </p:txBody>
       </p:sp>
-      <mc:AlternateContent xmlns:mc="http://schemas.openxmlformats.org/markup-compatibility/2006">
-        <mc:Choice xmlns:a14="http://schemas.microsoft.com/office/drawing/2010/main" Requires="a14">
+      <mc:AlternateContent xmlns:mc="http://schemas.openxmlformats.org/markup-compatibility/2006" xmlns:a14="http://schemas.microsoft.com/office/drawing/2010/main">
+        <mc:Choice Requires="a14">
           <p:sp>
             <p:nvSpPr>
               <p:cNvPr id="3" name="Content Placeholder 2">
@@ -20282,7 +20282,7 @@
             </p:txBody>
           </p:sp>
         </mc:Choice>
-        <mc:Fallback>
+        <mc:Fallback xmlns="">
           <p:sp>
             <p:nvSpPr>
               <p:cNvPr id="3" name="Content Placeholder 2">
@@ -21021,8 +21021,8 @@
           </a:p>
         </p:txBody>
       </p:sp>
-      <mc:AlternateContent xmlns:mc="http://schemas.openxmlformats.org/markup-compatibility/2006">
-        <mc:Choice xmlns:a14="http://schemas.microsoft.com/office/drawing/2010/main" Requires="a14">
+      <mc:AlternateContent xmlns:mc="http://schemas.openxmlformats.org/markup-compatibility/2006" xmlns:a14="http://schemas.microsoft.com/office/drawing/2010/main">
+        <mc:Choice Requires="a14">
           <p:sp>
             <p:nvSpPr>
               <p:cNvPr id="3" name="Content Placeholder 2">
@@ -21537,7 +21537,7 @@
             </p:txBody>
           </p:sp>
         </mc:Choice>
-        <mc:Fallback>
+        <mc:Fallback xmlns="">
           <p:sp>
             <p:nvSpPr>
               <p:cNvPr id="3" name="Content Placeholder 2">
@@ -21813,8 +21813,8 @@
           </a:p>
         </p:txBody>
       </p:sp>
-      <mc:AlternateContent xmlns:mc="http://schemas.openxmlformats.org/markup-compatibility/2006">
-        <mc:Choice xmlns:a14="http://schemas.microsoft.com/office/drawing/2010/main" Requires="a14">
+      <mc:AlternateContent xmlns:mc="http://schemas.openxmlformats.org/markup-compatibility/2006" xmlns:a14="http://schemas.microsoft.com/office/drawing/2010/main">
+        <mc:Choice Requires="a14">
           <p:sp>
             <p:nvSpPr>
               <p:cNvPr id="3" name="Content Placeholder 2"/>
@@ -22246,7 +22246,7 @@
             </p:txBody>
           </p:sp>
         </mc:Choice>
-        <mc:Fallback>
+        <mc:Fallback xmlns="">
           <p:sp>
             <p:nvSpPr>
               <p:cNvPr id="3" name="Content Placeholder 2"/>
@@ -23252,8 +23252,8 @@
           </a:p>
         </p:txBody>
       </p:sp>
-      <mc:AlternateContent xmlns:mc="http://schemas.openxmlformats.org/markup-compatibility/2006">
-        <mc:Choice xmlns:a14="http://schemas.microsoft.com/office/drawing/2010/main" Requires="a14">
+      <mc:AlternateContent xmlns:mc="http://schemas.openxmlformats.org/markup-compatibility/2006" xmlns:a14="http://schemas.microsoft.com/office/drawing/2010/main">
+        <mc:Choice Requires="a14">
           <p:sp>
             <p:nvSpPr>
               <p:cNvPr id="3" name="Content Placeholder 2"/>
@@ -23476,7 +23476,7 @@
             </p:txBody>
           </p:sp>
         </mc:Choice>
-        <mc:Fallback>
+        <mc:Fallback xmlns="">
           <p:sp>
             <p:nvSpPr>
               <p:cNvPr id="3" name="Content Placeholder 2"/>
@@ -23946,7 +23946,7 @@
                 <a:pPr lvl="1"/>
                 <a:r>
                   <a:rPr lang="en-US" dirty="0"/>
-                  <a:t>SE = </a:t>
+                  <a:t>SE=STD of mean RSS=RSS </a:t>
                 </a:r>
                 <a:r>
                   <a:rPr lang="en-US" dirty="0" err="1"/>
@@ -23954,7 +23954,7 @@
                 </a:r>
                 <a:r>
                   <a:rPr lang="en-US" dirty="0"/>
-                  <a:t> dev / </a:t>
+                  <a:t>/ </a:t>
                 </a:r>
                 <a14:m>
                   <m:oMath xmlns:m="http://schemas.openxmlformats.org/officeDocument/2006/math">
@@ -23962,7 +23962,7 @@
                       <m:radPr>
                         <m:degHide m:val="on"/>
                         <m:ctrlPr>
-                          <a:rPr lang="en-US" i="1" smtClean="0">
+                          <a:rPr lang="en-US" i="1">
                             <a:latin typeface="Cambria Math" panose="02040503050406030204" pitchFamily="18" charset="0"/>
                           </a:rPr>
                         </m:ctrlPr>
@@ -23970,13 +23970,13 @@
                       <m:deg/>
                       <m:e>
                         <m:r>
-                          <a:rPr lang="en-US" b="0" i="1" smtClean="0">
+                          <a:rPr lang="en-US" i="1">
                             <a:latin typeface="Cambria Math" panose="02040503050406030204" pitchFamily="18" charset="0"/>
                           </a:rPr>
                           <m:t>𝐾</m:t>
                         </m:r>
                         <m:r>
-                          <a:rPr lang="en-US" b="0" i="1" smtClean="0">
+                          <a:rPr lang="en-US" i="1">
                             <a:latin typeface="Cambria Math" panose="02040503050406030204" pitchFamily="18" charset="0"/>
                           </a:rPr>
                           <m:t>−1</m:t>
@@ -23991,21 +23991,16 @@
                 <a:pPr lvl="1"/>
                 <a:r>
                   <a:rPr lang="en-US" dirty="0"/>
-                  <a:t>Mean and SE averaged over the </a:t>
+                  <a:t>(expectation over different realizations </a:t>
                 </a:r>
-                <a14:m>
-                  <m:oMath xmlns:m="http://schemas.openxmlformats.org/officeDocument/2006/math">
-                    <m:r>
-                      <a:rPr lang="en-US" b="0" i="1" smtClean="0">
-                        <a:latin typeface="Cambria Math" panose="02040503050406030204" pitchFamily="18" charset="0"/>
-                      </a:rPr>
-                      <m:t>𝐾</m:t>
-                    </m:r>
-                  </m:oMath>
-                </a14:m>
+              </a:p>
+              <a:p>
+                <a:pPr marL="201168" lvl="1" indent="0">
+                  <a:buNone/>
+                </a:pPr>
                 <a:r>
                   <a:rPr lang="en-US" dirty="0"/>
-                  <a:t> folds</a:t>
+                  <a:t>    of data in each fold)</a:t>
                 </a:r>
               </a:p>
               <a:p>
@@ -24815,8 +24810,8 @@
           </a:p>
         </p:txBody>
       </p:sp>
-      <mc:AlternateContent xmlns:mc="http://schemas.openxmlformats.org/markup-compatibility/2006">
-        <mc:Choice xmlns:a14="http://schemas.microsoft.com/office/drawing/2010/main" Requires="a14">
+      <mc:AlternateContent xmlns:mc="http://schemas.openxmlformats.org/markup-compatibility/2006" xmlns:a14="http://schemas.microsoft.com/office/drawing/2010/main">
+        <mc:Choice Requires="a14">
           <p:sp>
             <p:nvSpPr>
               <p:cNvPr id="3" name="Content Placeholder 2">
@@ -24885,7 +24880,7 @@
             </p:txBody>
           </p:sp>
         </mc:Choice>
-        <mc:Fallback>
+        <mc:Fallback xmlns="">
           <p:sp>
             <p:nvSpPr>
               <p:cNvPr id="3" name="Content Placeholder 2">
@@ -25014,8 +25009,8 @@
           </a:p>
         </p:txBody>
       </p:sp>
-      <mc:AlternateContent xmlns:mc="http://schemas.openxmlformats.org/markup-compatibility/2006">
-        <mc:Choice xmlns:a14="http://schemas.microsoft.com/office/drawing/2010/main" Requires="a14">
+      <mc:AlternateContent xmlns:mc="http://schemas.openxmlformats.org/markup-compatibility/2006" xmlns:a14="http://schemas.microsoft.com/office/drawing/2010/main">
+        <mc:Choice Requires="a14">
           <p:sp>
             <p:nvSpPr>
               <p:cNvPr id="3" name="Content Placeholder 2">
@@ -25134,7 +25129,7 @@
             </p:txBody>
           </p:sp>
         </mc:Choice>
-        <mc:Fallback>
+        <mc:Fallback xmlns="">
           <p:sp>
             <p:nvSpPr>
               <p:cNvPr id="3" name="Content Placeholder 2">

</xml_diff>